<commit_message>
final changes for start of semester
</commit_message>
<xml_diff>
--- a/teaching/expdes/lec1.pptx
+++ b/teaching/expdes/lec1.pptx
@@ -3705,11 +3705,7 @@
             </a:r>
             <a:r>
               <a:rPr lang="en-US" sz="3200" dirty="0" smtClean="0"/>
-              <a:t>just another </a:t>
-            </a:r>
-            <a:r>
-              <a:rPr lang="en-US" sz="3200" dirty="0" smtClean="0"/>
-              <a:t>tool</a:t>
+              <a:t>just another tool</a:t>
             </a:r>
           </a:p>
           <a:p>
@@ -4400,11 +4396,7 @@
             </a:r>
             <a:r>
               <a:rPr lang="en-US" sz="3200" dirty="0" smtClean="0"/>
-              <a:t>environment</a:t>
-            </a:r>
-            <a:r>
-              <a:rPr lang="en-US" sz="3200" dirty="0" smtClean="0"/>
-              <a:t>.</a:t>
+              <a:t>environment.</a:t>
             </a:r>
           </a:p>
           <a:p>
@@ -4429,11 +4421,7 @@
             </a:r>
             <a:r>
               <a:rPr lang="en-US" sz="3200" dirty="0" smtClean="0"/>
-              <a:t>packages</a:t>
-            </a:r>
-            <a:r>
-              <a:rPr lang="en-US" sz="3200" dirty="0" smtClean="0"/>
-              <a:t>.</a:t>
+              <a:t>packages.</a:t>
             </a:r>
           </a:p>
           <a:p>
@@ -4458,11 +4446,7 @@
             </a:r>
             <a:r>
               <a:rPr lang="en-US" sz="3200" dirty="0" smtClean="0"/>
-              <a:t>graphing</a:t>
-            </a:r>
-            <a:r>
-              <a:rPr lang="en-US" sz="3200" dirty="0" smtClean="0"/>
-              <a:t>.</a:t>
+              <a:t>graphing.</a:t>
             </a:r>
           </a:p>
           <a:p>

</xml_diff>